<commit_message>
Small addition to presentation
</commit_message>
<xml_diff>
--- a/midterm_presentation/presentation.pptx
+++ b/midterm_presentation/presentation.pptx
@@ -205,7 +205,7 @@
           <a:p>
             <a:fld id="{2CD452B4-B680-4D50-B5C0-005E07156091}" type="datetimeFigureOut">
               <a:rPr lang="en-GB" smtClean="0"/>
-              <a:t>20/11/2024</a:t>
+              <a:t>21/11/2024</a:t>
             </a:fld>
             <a:endParaRPr lang="en-GB"/>
           </a:p>
@@ -622,7 +622,7 @@
           <a:p>
             <a:fld id="{FEBC3A76-EEAA-4492-B6E5-7C3E50806E5E}" type="datetime1">
               <a:rPr lang="en-GB" smtClean="0"/>
-              <a:t>20/11/2024</a:t>
+              <a:t>21/11/2024</a:t>
             </a:fld>
             <a:endParaRPr lang="en-GB"/>
           </a:p>
@@ -822,7 +822,7 @@
           <a:p>
             <a:fld id="{5BFF23CC-9374-4F8D-8AAA-830E08338700}" type="datetime1">
               <a:rPr lang="en-GB" smtClean="0"/>
-              <a:t>20/11/2024</a:t>
+              <a:t>21/11/2024</a:t>
             </a:fld>
             <a:endParaRPr lang="en-GB"/>
           </a:p>
@@ -1032,7 +1032,7 @@
           <a:p>
             <a:fld id="{09F0DE8F-EC11-419D-A04C-47418252B15F}" type="datetime1">
               <a:rPr lang="en-GB" smtClean="0"/>
-              <a:t>20/11/2024</a:t>
+              <a:t>21/11/2024</a:t>
             </a:fld>
             <a:endParaRPr lang="en-GB"/>
           </a:p>
@@ -1242,7 +1242,7 @@
           <a:p>
             <a:fld id="{FD98A924-F912-4A2C-8AD5-70325C406580}" type="datetime1">
               <a:rPr lang="en-GB" smtClean="0"/>
-              <a:t>20/11/2024</a:t>
+              <a:t>21/11/2024</a:t>
             </a:fld>
             <a:endParaRPr lang="en-GB"/>
           </a:p>
@@ -1518,7 +1518,7 @@
           <a:p>
             <a:fld id="{1C0B9BCF-AB94-488C-948B-CDD4CEBE7896}" type="datetime1">
               <a:rPr lang="en-GB" smtClean="0"/>
-              <a:t>20/11/2024</a:t>
+              <a:t>21/11/2024</a:t>
             </a:fld>
             <a:endParaRPr lang="en-GB"/>
           </a:p>
@@ -1786,7 +1786,7 @@
           <a:p>
             <a:fld id="{AF644975-7301-4117-9166-713D0AB03586}" type="datetime1">
               <a:rPr lang="en-GB" smtClean="0"/>
-              <a:t>20/11/2024</a:t>
+              <a:t>21/11/2024</a:t>
             </a:fld>
             <a:endParaRPr lang="en-GB"/>
           </a:p>
@@ -2201,7 +2201,7 @@
           <a:p>
             <a:fld id="{E7349689-D4DE-46DD-A75D-977233A2292A}" type="datetime1">
               <a:rPr lang="en-GB" smtClean="0"/>
-              <a:t>20/11/2024</a:t>
+              <a:t>21/11/2024</a:t>
             </a:fld>
             <a:endParaRPr lang="en-GB"/>
           </a:p>
@@ -2343,7 +2343,7 @@
           <a:p>
             <a:fld id="{7734036A-B053-46E7-9567-C2CEB76CC704}" type="datetime1">
               <a:rPr lang="en-GB" smtClean="0"/>
-              <a:t>20/11/2024</a:t>
+              <a:t>21/11/2024</a:t>
             </a:fld>
             <a:endParaRPr lang="en-GB"/>
           </a:p>
@@ -2456,7 +2456,7 @@
           <a:p>
             <a:fld id="{999861E0-6499-49E7-A4F1-25197A0D104C}" type="datetime1">
               <a:rPr lang="en-GB" smtClean="0"/>
-              <a:t>20/11/2024</a:t>
+              <a:t>21/11/2024</a:t>
             </a:fld>
             <a:endParaRPr lang="en-GB"/>
           </a:p>
@@ -2769,7 +2769,7 @@
           <a:p>
             <a:fld id="{2E6E681C-FDCF-4342-B10C-6A0CCE4B2B3E}" type="datetime1">
               <a:rPr lang="en-GB" smtClean="0"/>
-              <a:t>20/11/2024</a:t>
+              <a:t>21/11/2024</a:t>
             </a:fld>
             <a:endParaRPr lang="en-GB"/>
           </a:p>
@@ -3058,7 +3058,7 @@
           <a:p>
             <a:fld id="{01FCF1FC-84EB-4CE5-AED3-54FDA9D5CFA3}" type="datetime1">
               <a:rPr lang="en-GB" smtClean="0"/>
-              <a:t>20/11/2024</a:t>
+              <a:t>21/11/2024</a:t>
             </a:fld>
             <a:endParaRPr lang="en-GB"/>
           </a:p>
@@ -3355,7 +3355,7 @@
           <a:p>
             <a:fld id="{6E569589-78F7-41FE-9045-3B27AB77D20D}" type="datetime1">
               <a:rPr lang="en-GB" smtClean="0"/>
-              <a:t>20/11/2024</a:t>
+              <a:t>21/11/2024</a:t>
             </a:fld>
             <a:endParaRPr lang="en-GB"/>
           </a:p>
@@ -4981,8 +4981,47 @@
         </p:nvSpPr>
         <p:spPr/>
         <p:txBody>
-          <a:bodyPr/>
-          <a:lstStyle/>
+          <a:bodyPr>
+            <a:normAutofit fontScale="85000" lnSpcReduction="20000"/>
+          </a:bodyPr>
+          <a:lstStyle/>
+          <a:p>
+            <a:r>
+              <a:rPr lang="en-GB" dirty="0"/>
+              <a:t>TIMBER-V</a:t>
+            </a:r>
+          </a:p>
+          <a:p>
+            <a:pPr lvl="1"/>
+            <a:r>
+              <a:rPr lang="en-GB" dirty="0"/>
+              <a:t>RISC-V based</a:t>
+            </a:r>
+          </a:p>
+          <a:p>
+            <a:pPr lvl="1"/>
+            <a:r>
+              <a:rPr lang="en-GB" dirty="0"/>
+              <a:t>Includes ISA changes </a:t>
+            </a:r>
+          </a:p>
+          <a:p>
+            <a:pPr lvl="1"/>
+            <a:r>
+              <a:rPr lang="en-GB" dirty="0"/>
+              <a:t>Only MPU needed for memory protection guarantees</a:t>
+            </a:r>
+          </a:p>
+          <a:p>
+            <a:pPr lvl="1"/>
+            <a:r>
+              <a:rPr lang="en-GB" dirty="0"/>
+              <a:t>GitHub last updated 6 years ago</a:t>
+            </a:r>
+          </a:p>
+          <a:p>
+            <a:endParaRPr lang="en-GB" dirty="0"/>
+          </a:p>
           <a:p>
             <a:r>
               <a:rPr lang="en-GB" dirty="0"/>

</xml_diff>